<commit_message>
increase label font sizes
</commit_message>
<xml_diff>
--- a/site/_image_sources/homonim-block_diagram.pptx
+++ b/site/_image_sources/homonim-block_diagram.pptx
@@ -316,7 +316,7 @@
             <a:fld id="{1D8BD707-D9CF-40AE-B4C6-C98DA3205C09}" type="datetimeFigureOut">
               <a:rPr lang="en-US" smtClean="0"/>
               <a:pPr/>
-              <a:t>3/23/2023</a:t>
+              <a:t>4/4/2023</a:t>
             </a:fld>
             <a:endParaRPr lang="en-US"/>
           </a:p>
@@ -483,7 +483,7 @@
             <a:fld id="{1D8BD707-D9CF-40AE-B4C6-C98DA3205C09}" type="datetimeFigureOut">
               <a:rPr lang="en-US" smtClean="0"/>
               <a:pPr/>
-              <a:t>3/23/2023</a:t>
+              <a:t>4/4/2023</a:t>
             </a:fld>
             <a:endParaRPr lang="en-US"/>
           </a:p>
@@ -660,7 +660,7 @@
             <a:fld id="{1D8BD707-D9CF-40AE-B4C6-C98DA3205C09}" type="datetimeFigureOut">
               <a:rPr lang="en-US" smtClean="0"/>
               <a:pPr/>
-              <a:t>3/23/2023</a:t>
+              <a:t>4/4/2023</a:t>
             </a:fld>
             <a:endParaRPr lang="en-US"/>
           </a:p>
@@ -827,7 +827,7 @@
             <a:fld id="{1D8BD707-D9CF-40AE-B4C6-C98DA3205C09}" type="datetimeFigureOut">
               <a:rPr lang="en-US" smtClean="0"/>
               <a:pPr/>
-              <a:t>3/23/2023</a:t>
+              <a:t>4/4/2023</a:t>
             </a:fld>
             <a:endParaRPr lang="en-US"/>
           </a:p>
@@ -1070,7 +1070,7 @@
             <a:fld id="{1D8BD707-D9CF-40AE-B4C6-C98DA3205C09}" type="datetimeFigureOut">
               <a:rPr lang="en-US" smtClean="0"/>
               <a:pPr/>
-              <a:t>3/23/2023</a:t>
+              <a:t>4/4/2023</a:t>
             </a:fld>
             <a:endParaRPr lang="en-US"/>
           </a:p>
@@ -1355,7 +1355,7 @@
             <a:fld id="{1D8BD707-D9CF-40AE-B4C6-C98DA3205C09}" type="datetimeFigureOut">
               <a:rPr lang="en-US" smtClean="0"/>
               <a:pPr/>
-              <a:t>3/23/2023</a:t>
+              <a:t>4/4/2023</a:t>
             </a:fld>
             <a:endParaRPr lang="en-US"/>
           </a:p>
@@ -1774,7 +1774,7 @@
             <a:fld id="{1D8BD707-D9CF-40AE-B4C6-C98DA3205C09}" type="datetimeFigureOut">
               <a:rPr lang="en-US" smtClean="0"/>
               <a:pPr/>
-              <a:t>3/23/2023</a:t>
+              <a:t>4/4/2023</a:t>
             </a:fld>
             <a:endParaRPr lang="en-US"/>
           </a:p>
@@ -1889,7 +1889,7 @@
             <a:fld id="{1D8BD707-D9CF-40AE-B4C6-C98DA3205C09}" type="datetimeFigureOut">
               <a:rPr lang="en-US" smtClean="0"/>
               <a:pPr/>
-              <a:t>3/23/2023</a:t>
+              <a:t>4/4/2023</a:t>
             </a:fld>
             <a:endParaRPr lang="en-US"/>
           </a:p>
@@ -1981,7 +1981,7 @@
             <a:fld id="{1D8BD707-D9CF-40AE-B4C6-C98DA3205C09}" type="datetimeFigureOut">
               <a:rPr lang="en-US" smtClean="0"/>
               <a:pPr/>
-              <a:t>3/23/2023</a:t>
+              <a:t>4/4/2023</a:t>
             </a:fld>
             <a:endParaRPr lang="en-US"/>
           </a:p>
@@ -2255,7 +2255,7 @@
             <a:fld id="{1D8BD707-D9CF-40AE-B4C6-C98DA3205C09}" type="datetimeFigureOut">
               <a:rPr lang="en-US" smtClean="0"/>
               <a:pPr/>
-              <a:t>3/23/2023</a:t>
+              <a:t>4/4/2023</a:t>
             </a:fld>
             <a:endParaRPr lang="en-US"/>
           </a:p>
@@ -2505,7 +2505,7 @@
             <a:fld id="{1D8BD707-D9CF-40AE-B4C6-C98DA3205C09}" type="datetimeFigureOut">
               <a:rPr lang="en-US" smtClean="0"/>
               <a:pPr/>
-              <a:t>3/23/2023</a:t>
+              <a:t>4/4/2023</a:t>
             </a:fld>
             <a:endParaRPr lang="en-US"/>
           </a:p>
@@ -2715,7 +2715,7 @@
             <a:fld id="{1D8BD707-D9CF-40AE-B4C6-C98DA3205C09}" type="datetimeFigureOut">
               <a:rPr lang="en-US" smtClean="0"/>
               <a:pPr/>
-              <a:t>3/23/2023</a:t>
+              <a:t>4/4/2023</a:t>
             </a:fld>
             <a:endParaRPr lang="en-US"/>
           </a:p>
@@ -3105,7 +3105,7 @@
           <p:nvPr>
             <p:extLst>
               <p:ext uri="{D42A27DB-BD31-4B8C-83A1-F6EECF244321}">
-                <p14:modId xmlns:p14="http://schemas.microsoft.com/office/powerpoint/2010/main" val="1255555133"/>
+                <p14:modId xmlns:p14="http://schemas.microsoft.com/office/powerpoint/2010/main" val="693438959"/>
               </p:ext>
             </p:extLst>
           </p:nvPr>
@@ -3744,13 +3744,6 @@
                         </a:rPr>
                         <a:t>Source </a:t>
                       </a:r>
-                      <a:endParaRPr lang="en-US" sz="1400" b="1" dirty="0" smtClean="0">
-                        <a:solidFill>
-                          <a:schemeClr val="accent1">
-                            <a:lumMod val="75000"/>
-                          </a:schemeClr>
-                        </a:solidFill>
-                      </a:endParaRPr>
                     </a:p>
                     <a:p>
                       <a:pPr marL="0" marR="0" indent="0" algn="l" defTabSz="914400" rtl="0" eaLnBrk="1" fontAlgn="auto" latinLnBrk="0" hangingPunct="1">
@@ -3780,13 +3773,6 @@
                         </a:rPr>
                         <a:t>CRS </a:t>
                       </a:r>
-                      <a:endParaRPr lang="en-US" sz="1400" b="1" dirty="0" smtClean="0">
-                        <a:solidFill>
-                          <a:schemeClr val="accent1">
-                            <a:lumMod val="75000"/>
-                          </a:schemeClr>
-                        </a:solidFill>
-                      </a:endParaRPr>
                     </a:p>
                   </a:txBody>
                   <a:tcPr anchor="ctr">
@@ -4116,7 +4102,7 @@
           <a:p>
             <a:pPr algn="ctr"/>
             <a:r>
-              <a:rPr lang="en-GB" sz="1000" b="1" dirty="0" smtClean="0">
+              <a:rPr lang="en-GB" sz="1200" b="1" dirty="0" smtClean="0">
                 <a:solidFill>
                   <a:schemeClr val="accent1">
                     <a:lumMod val="75000"/>
@@ -4125,7 +4111,7 @@
               </a:rPr>
               <a:t>src</a:t>
             </a:r>
-            <a:endParaRPr lang="en-GB" sz="1000" b="1" dirty="0">
+            <a:endParaRPr lang="en-GB" sz="1200" b="1" dirty="0">
               <a:solidFill>
                 <a:schemeClr val="accent1">
                   <a:lumMod val="75000"/>
@@ -4260,7 +4246,7 @@
           <a:p>
             <a:pPr algn="ctr"/>
             <a:r>
-              <a:rPr lang="en-US" sz="1000" b="1" dirty="0" smtClean="0">
+              <a:rPr lang="en-US" sz="1200" b="1" dirty="0" smtClean="0">
                 <a:solidFill>
                   <a:schemeClr val="accent3">
                     <a:lumMod val="75000"/>
@@ -4269,7 +4255,7 @@
               </a:rPr>
               <a:t>src</a:t>
             </a:r>
-            <a:endParaRPr lang="en-GB" sz="1000" b="1" dirty="0">
+            <a:endParaRPr lang="en-GB" sz="1200" b="1" dirty="0">
               <a:solidFill>
                 <a:schemeClr val="accent3">
                   <a:lumMod val="75000"/>
@@ -4427,8 +4413,8 @@
         </p:nvSpPr>
         <p:spPr>
           <a:xfrm>
-            <a:off x="3581400" y="2447092"/>
-            <a:ext cx="895434" cy="677108"/>
+            <a:off x="3578183" y="2454775"/>
+            <a:ext cx="993817" cy="646331"/>
           </a:xfrm>
           <a:prstGeom prst="rect">
             <a:avLst/>
@@ -4442,7 +4428,7 @@
           <a:lstStyle/>
           <a:p>
             <a:r>
-              <a:rPr lang="en-US" sz="1000" dirty="0" smtClean="0">
+              <a:rPr lang="en-US" sz="1200" dirty="0" smtClean="0">
                 <a:solidFill>
                   <a:schemeClr val="tx1">
                     <a:lumMod val="65000"/>
@@ -4450,20 +4436,9 @@
                   </a:schemeClr>
                 </a:solidFill>
               </a:rPr>
-              <a:t>Local model </a:t>
-            </a:r>
-            <a:r>
-              <a:rPr lang="en-US" sz="1000" dirty="0" smtClean="0">
-                <a:solidFill>
-                  <a:schemeClr val="tx1">
-                    <a:lumMod val="65000"/>
-                    <a:lumOff val="35000"/>
-                  </a:schemeClr>
-                </a:solidFill>
-              </a:rPr>
-              <a:t>fitting</a:t>
-            </a:r>
-            <a:endParaRPr lang="el-GR" sz="1000" dirty="0">
+              <a:t>Local model fitting</a:t>
+            </a:r>
+            <a:endParaRPr lang="el-GR" sz="1200" dirty="0">
               <a:solidFill>
                 <a:schemeClr val="tx1">
                   <a:lumMod val="65000"/>
@@ -4473,7 +4448,7 @@
             </a:endParaRPr>
           </a:p>
           <a:p>
-            <a:endParaRPr lang="en-GB" dirty="0"/>
+            <a:endParaRPr lang="en-GB" sz="1200" dirty="0"/>
           </a:p>
         </p:txBody>
       </p:sp>
@@ -4625,8 +4600,8 @@
         </p:nvSpPr>
         <p:spPr>
           <a:xfrm rot="18072269">
-            <a:off x="2407137" y="4015089"/>
-            <a:ext cx="895434" cy="246221"/>
+            <a:off x="2352930" y="3957059"/>
+            <a:ext cx="1024486" cy="276999"/>
           </a:xfrm>
           <a:prstGeom prst="rect">
             <a:avLst/>
@@ -4640,7 +4615,7 @@
           <a:lstStyle/>
           <a:p>
             <a:r>
-              <a:rPr lang="en-US" sz="1000" dirty="0" err="1" smtClean="0">
+              <a:rPr lang="en-US" sz="1200" dirty="0" err="1" smtClean="0">
                 <a:solidFill>
                   <a:schemeClr val="tx1">
                     <a:lumMod val="65000"/>
@@ -4650,7 +4625,7 @@
               </a:rPr>
               <a:t>Downsample</a:t>
             </a:r>
-            <a:endParaRPr lang="en-GB" dirty="0"/>
+            <a:endParaRPr lang="en-GB" sz="1200" dirty="0"/>
           </a:p>
         </p:txBody>
       </p:sp>
@@ -4707,7 +4682,7 @@
           <a:p>
             <a:pPr algn="ctr"/>
             <a:r>
-              <a:rPr lang="en-US" sz="1000" b="1" dirty="0" smtClean="0">
+              <a:rPr lang="en-US" sz="1200" b="1" dirty="0" smtClean="0">
                 <a:solidFill>
                   <a:schemeClr val="accent3">
                     <a:lumMod val="75000"/>
@@ -4716,7 +4691,7 @@
               </a:rPr>
               <a:t>M</a:t>
             </a:r>
-            <a:endParaRPr lang="en-GB" sz="1000" b="1" dirty="0">
+            <a:endParaRPr lang="en-GB" sz="1200" b="1" dirty="0">
               <a:solidFill>
                 <a:schemeClr val="accent3">
                   <a:lumMod val="75000"/>
@@ -4779,7 +4754,7 @@
           <a:p>
             <a:pPr algn="ctr"/>
             <a:r>
-              <a:rPr lang="en-US" sz="1000" b="1" dirty="0" smtClean="0">
+              <a:rPr lang="en-US" sz="1200" b="1" dirty="0" smtClean="0">
                 <a:solidFill>
                   <a:schemeClr val="accent3">
                     <a:lumMod val="75000"/>
@@ -4788,7 +4763,7 @@
               </a:rPr>
               <a:t>C</a:t>
             </a:r>
-            <a:endParaRPr lang="en-GB" sz="1000" b="1" dirty="0">
+            <a:endParaRPr lang="en-GB" sz="1200" b="1" dirty="0">
               <a:solidFill>
                 <a:schemeClr val="accent3">
                   <a:lumMod val="75000"/>
@@ -4938,7 +4913,7 @@
           <a:p>
             <a:pPr algn="ctr"/>
             <a:r>
-              <a:rPr lang="en-US" sz="1000" b="1" dirty="0" smtClean="0">
+              <a:rPr lang="en-US" sz="1200" b="1" dirty="0" smtClean="0">
                 <a:solidFill>
                   <a:schemeClr val="accent1">
                     <a:lumMod val="75000"/>
@@ -4947,7 +4922,7 @@
               </a:rPr>
               <a:t>src</a:t>
             </a:r>
-            <a:endParaRPr lang="en-GB" sz="1000" b="1" dirty="0">
+            <a:endParaRPr lang="en-GB" sz="1200" b="1" dirty="0">
               <a:solidFill>
                 <a:schemeClr val="accent1">
                   <a:lumMod val="75000"/>
@@ -5055,7 +5030,7 @@
           <a:p>
             <a:pPr algn="ctr"/>
             <a:r>
-              <a:rPr lang="en-US" sz="1000" b="1" dirty="0" smtClean="0">
+              <a:rPr lang="en-US" sz="1200" b="1" dirty="0" smtClean="0">
                 <a:solidFill>
                   <a:schemeClr val="accent1">
                     <a:lumMod val="75000"/>
@@ -5064,7 +5039,7 @@
               </a:rPr>
               <a:t>M</a:t>
             </a:r>
-            <a:endParaRPr lang="en-GB" sz="1000" b="1" dirty="0">
+            <a:endParaRPr lang="en-GB" sz="1200" b="1" dirty="0">
               <a:solidFill>
                 <a:schemeClr val="accent1">
                   <a:lumMod val="75000"/>
@@ -5130,7 +5105,7 @@
           <a:p>
             <a:pPr algn="ctr"/>
             <a:r>
-              <a:rPr lang="en-US" sz="1000" b="1" dirty="0" smtClean="0">
+              <a:rPr lang="en-US" sz="1200" b="1" dirty="0" smtClean="0">
                 <a:solidFill>
                   <a:schemeClr val="accent1">
                     <a:lumMod val="75000"/>
@@ -5139,7 +5114,7 @@
               </a:rPr>
               <a:t>C</a:t>
             </a:r>
-            <a:endParaRPr lang="en-GB" sz="1000" b="1" dirty="0">
+            <a:endParaRPr lang="en-GB" sz="1200" b="1" dirty="0">
               <a:solidFill>
                 <a:schemeClr val="accent1">
                   <a:lumMod val="75000"/>
@@ -5331,8 +5306,8 @@
         </p:nvSpPr>
         <p:spPr>
           <a:xfrm rot="2531067">
-            <a:off x="5456646" y="3491871"/>
-            <a:ext cx="785831" cy="246221"/>
+            <a:off x="5506498" y="3551311"/>
+            <a:ext cx="938620" cy="276999"/>
           </a:xfrm>
           <a:prstGeom prst="rect">
             <a:avLst/>
@@ -5346,7 +5321,7 @@
           <a:lstStyle/>
           <a:p>
             <a:r>
-              <a:rPr lang="en-US" sz="1000" dirty="0" err="1" smtClean="0">
+              <a:rPr lang="en-US" sz="1200" dirty="0" err="1" smtClean="0">
                 <a:solidFill>
                   <a:schemeClr val="tx1">
                     <a:lumMod val="65000"/>
@@ -5356,7 +5331,7 @@
               </a:rPr>
               <a:t>Upsample</a:t>
             </a:r>
-            <a:endParaRPr lang="en-US" sz="1000" dirty="0" smtClean="0">
+            <a:endParaRPr lang="en-US" sz="1200" dirty="0" smtClean="0">
               <a:solidFill>
                 <a:schemeClr val="tx1">
                   <a:lumMod val="65000"/>
@@ -5375,8 +5350,8 @@
         </p:nvSpPr>
         <p:spPr>
           <a:xfrm rot="2593608">
-            <a:off x="5181881" y="3720971"/>
-            <a:ext cx="726855" cy="246221"/>
+            <a:off x="5258911" y="3816860"/>
+            <a:ext cx="841006" cy="276999"/>
           </a:xfrm>
           <a:prstGeom prst="rect">
             <a:avLst/>
@@ -5390,7 +5365,7 @@
           <a:lstStyle/>
           <a:p>
             <a:r>
-              <a:rPr lang="en-US" sz="1000" dirty="0" err="1" smtClean="0">
+              <a:rPr lang="en-US" sz="1200" dirty="0" err="1" smtClean="0">
                 <a:solidFill>
                   <a:schemeClr val="tx1">
                     <a:lumMod val="65000"/>
@@ -5400,7 +5375,7 @@
               </a:rPr>
               <a:t>Upsample</a:t>
             </a:r>
-            <a:endParaRPr lang="en-US" sz="1000" dirty="0" smtClean="0">
+            <a:endParaRPr lang="en-US" sz="1200" dirty="0" smtClean="0">
               <a:solidFill>
                 <a:schemeClr val="tx1">
                   <a:lumMod val="65000"/>
@@ -5466,7 +5441,7 @@
           <a:lstStyle/>
           <a:p>
             <a:pPr algn="ctr"/>
-            <a:endParaRPr lang="en-GB" sz="1000" dirty="0">
+            <a:endParaRPr lang="en-GB" sz="1200" dirty="0">
               <a:solidFill>
                 <a:schemeClr val="accent1">
                   <a:lumMod val="75000"/>
@@ -5652,8 +5627,8 @@
         </p:nvSpPr>
         <p:spPr>
           <a:xfrm>
-            <a:off x="4438566" y="2448580"/>
-            <a:ext cx="895434" cy="523220"/>
+            <a:off x="4514766" y="2448580"/>
+            <a:ext cx="895434" cy="461665"/>
           </a:xfrm>
           <a:prstGeom prst="rect">
             <a:avLst/>
@@ -5667,7 +5642,7 @@
           <a:lstStyle/>
           <a:p>
             <a:r>
-              <a:rPr lang="en-US" sz="1000" dirty="0" smtClean="0">
+              <a:rPr lang="en-US" sz="1200" dirty="0" smtClean="0">
                 <a:solidFill>
                   <a:schemeClr val="tx1">
                     <a:lumMod val="65000"/>
@@ -5677,7 +5652,7 @@
               </a:rPr>
               <a:t>Parameters</a:t>
             </a:r>
-            <a:endParaRPr lang="el-GR" sz="1000" dirty="0" smtClean="0">
+            <a:endParaRPr lang="el-GR" sz="1200" dirty="0" smtClean="0">
               <a:solidFill>
                 <a:schemeClr val="tx1">
                   <a:lumMod val="65000"/>
@@ -5687,7 +5662,7 @@
             </a:endParaRPr>
           </a:p>
           <a:p>
-            <a:endParaRPr lang="en-GB" dirty="0"/>
+            <a:endParaRPr lang="en-GB" sz="1200" dirty="0"/>
           </a:p>
         </p:txBody>
       </p:sp>
@@ -6470,14 +6445,6 @@
                         </a:rPr>
                         <a:t>Source </a:t>
                       </a:r>
-                      <a:endParaRPr lang="en-US" sz="1400" b="1" dirty="0" smtClean="0">
-                        <a:solidFill>
-                          <a:schemeClr val="accent1">
-                            <a:lumMod val="20000"/>
-                            <a:lumOff val="80000"/>
-                          </a:schemeClr>
-                        </a:solidFill>
-                      </a:endParaRPr>
                     </a:p>
                     <a:p>
                       <a:pPr marL="0" marR="0" indent="0" algn="l" defTabSz="914400" rtl="0" eaLnBrk="1" fontAlgn="auto" latinLnBrk="0" hangingPunct="1">
@@ -6508,14 +6475,6 @@
                         </a:rPr>
                         <a:t>CRS </a:t>
                       </a:r>
-                      <a:endParaRPr lang="en-US" sz="1400" b="1" dirty="0" smtClean="0">
-                        <a:solidFill>
-                          <a:schemeClr val="accent1">
-                            <a:lumMod val="20000"/>
-                            <a:lumOff val="80000"/>
-                          </a:schemeClr>
-                        </a:solidFill>
-                      </a:endParaRPr>
                     </a:p>
                   </a:txBody>
                   <a:tcPr anchor="ctr">
@@ -8356,8 +8315,8 @@
           </a:fontRef>
         </p:style>
       </p:cxnSp>
-      <mc:AlternateContent xmlns:mc="http://schemas.openxmlformats.org/markup-compatibility/2006">
-        <mc:Choice xmlns:a14="http://schemas.microsoft.com/office/drawing/2010/main" Requires="a14">
+      <mc:AlternateContent xmlns:mc="http://schemas.openxmlformats.org/markup-compatibility/2006" xmlns:a14="http://schemas.microsoft.com/office/drawing/2010/main">
+        <mc:Choice Requires="a14">
           <p:sp>
             <p:nvSpPr>
               <p:cNvPr id="32" name="TextBox 31"/>
@@ -8447,7 +8406,7 @@
             </p:txBody>
           </p:sp>
         </mc:Choice>
-        <mc:Fallback>
+        <mc:Fallback xmlns="">
           <p:sp>
             <p:nvSpPr>
               <p:cNvPr id="32" name="TextBox 31"/>

</xml_diff>

<commit_message>
small font size increase
</commit_message>
<xml_diff>
--- a/site/_image_sources/homonim-block_diagram.pptx
+++ b/site/_image_sources/homonim-block_diagram.pptx
@@ -316,7 +316,7 @@
             <a:fld id="{1D8BD707-D9CF-40AE-B4C6-C98DA3205C09}" type="datetimeFigureOut">
               <a:rPr lang="en-US" smtClean="0"/>
               <a:pPr/>
-              <a:t>4/4/2023</a:t>
+              <a:t>4/5/2023</a:t>
             </a:fld>
             <a:endParaRPr lang="en-US"/>
           </a:p>
@@ -483,7 +483,7 @@
             <a:fld id="{1D8BD707-D9CF-40AE-B4C6-C98DA3205C09}" type="datetimeFigureOut">
               <a:rPr lang="en-US" smtClean="0"/>
               <a:pPr/>
-              <a:t>4/4/2023</a:t>
+              <a:t>4/5/2023</a:t>
             </a:fld>
             <a:endParaRPr lang="en-US"/>
           </a:p>
@@ -660,7 +660,7 @@
             <a:fld id="{1D8BD707-D9CF-40AE-B4C6-C98DA3205C09}" type="datetimeFigureOut">
               <a:rPr lang="en-US" smtClean="0"/>
               <a:pPr/>
-              <a:t>4/4/2023</a:t>
+              <a:t>4/5/2023</a:t>
             </a:fld>
             <a:endParaRPr lang="en-US"/>
           </a:p>
@@ -827,7 +827,7 @@
             <a:fld id="{1D8BD707-D9CF-40AE-B4C6-C98DA3205C09}" type="datetimeFigureOut">
               <a:rPr lang="en-US" smtClean="0"/>
               <a:pPr/>
-              <a:t>4/4/2023</a:t>
+              <a:t>4/5/2023</a:t>
             </a:fld>
             <a:endParaRPr lang="en-US"/>
           </a:p>
@@ -1070,7 +1070,7 @@
             <a:fld id="{1D8BD707-D9CF-40AE-B4C6-C98DA3205C09}" type="datetimeFigureOut">
               <a:rPr lang="en-US" smtClean="0"/>
               <a:pPr/>
-              <a:t>4/4/2023</a:t>
+              <a:t>4/5/2023</a:t>
             </a:fld>
             <a:endParaRPr lang="en-US"/>
           </a:p>
@@ -1355,7 +1355,7 @@
             <a:fld id="{1D8BD707-D9CF-40AE-B4C6-C98DA3205C09}" type="datetimeFigureOut">
               <a:rPr lang="en-US" smtClean="0"/>
               <a:pPr/>
-              <a:t>4/4/2023</a:t>
+              <a:t>4/5/2023</a:t>
             </a:fld>
             <a:endParaRPr lang="en-US"/>
           </a:p>
@@ -1774,7 +1774,7 @@
             <a:fld id="{1D8BD707-D9CF-40AE-B4C6-C98DA3205C09}" type="datetimeFigureOut">
               <a:rPr lang="en-US" smtClean="0"/>
               <a:pPr/>
-              <a:t>4/4/2023</a:t>
+              <a:t>4/5/2023</a:t>
             </a:fld>
             <a:endParaRPr lang="en-US"/>
           </a:p>
@@ -1889,7 +1889,7 @@
             <a:fld id="{1D8BD707-D9CF-40AE-B4C6-C98DA3205C09}" type="datetimeFigureOut">
               <a:rPr lang="en-US" smtClean="0"/>
               <a:pPr/>
-              <a:t>4/4/2023</a:t>
+              <a:t>4/5/2023</a:t>
             </a:fld>
             <a:endParaRPr lang="en-US"/>
           </a:p>
@@ -1981,7 +1981,7 @@
             <a:fld id="{1D8BD707-D9CF-40AE-B4C6-C98DA3205C09}" type="datetimeFigureOut">
               <a:rPr lang="en-US" smtClean="0"/>
               <a:pPr/>
-              <a:t>4/4/2023</a:t>
+              <a:t>4/5/2023</a:t>
             </a:fld>
             <a:endParaRPr lang="en-US"/>
           </a:p>
@@ -2255,7 +2255,7 @@
             <a:fld id="{1D8BD707-D9CF-40AE-B4C6-C98DA3205C09}" type="datetimeFigureOut">
               <a:rPr lang="en-US" smtClean="0"/>
               <a:pPr/>
-              <a:t>4/4/2023</a:t>
+              <a:t>4/5/2023</a:t>
             </a:fld>
             <a:endParaRPr lang="en-US"/>
           </a:p>
@@ -2505,7 +2505,7 @@
             <a:fld id="{1D8BD707-D9CF-40AE-B4C6-C98DA3205C09}" type="datetimeFigureOut">
               <a:rPr lang="en-US" smtClean="0"/>
               <a:pPr/>
-              <a:t>4/4/2023</a:t>
+              <a:t>4/5/2023</a:t>
             </a:fld>
             <a:endParaRPr lang="en-US"/>
           </a:p>
@@ -2715,7 +2715,7 @@
             <a:fld id="{1D8BD707-D9CF-40AE-B4C6-C98DA3205C09}" type="datetimeFigureOut">
               <a:rPr lang="en-US" smtClean="0"/>
               <a:pPr/>
-              <a:t>4/4/2023</a:t>
+              <a:t>4/5/2023</a:t>
             </a:fld>
             <a:endParaRPr lang="en-US"/>
           </a:p>
@@ -3105,14 +3105,14 @@
           <p:nvPr>
             <p:extLst>
               <p:ext uri="{D42A27DB-BD31-4B8C-83A1-F6EECF244321}">
-                <p14:modId xmlns:p14="http://schemas.microsoft.com/office/powerpoint/2010/main" val="693438959"/>
+                <p14:modId xmlns:p14="http://schemas.microsoft.com/office/powerpoint/2010/main" val="730996865"/>
               </p:ext>
             </p:extLst>
           </p:nvPr>
         </p:nvGraphicFramePr>
         <p:xfrm>
           <a:off x="879295" y="1899137"/>
-          <a:ext cx="7197904" cy="3510475"/>
+          <a:ext cx="7274105" cy="3570568"/>
         </p:xfrm>
         <a:graphic>
           <a:graphicData uri="http://schemas.openxmlformats.org/drawingml/2006/table">
@@ -3126,7 +3126,7 @@
                 <a:gridCol w="838200"/>
                 <a:gridCol w="2362200"/>
                 <a:gridCol w="1828800"/>
-                <a:gridCol w="1066799"/>
+                <a:gridCol w="1143000"/>
               </a:tblGrid>
               <a:tr h="519027">
                 <a:tc>
@@ -3225,16 +3225,26 @@
                     <a:p>
                       <a:pPr algn="ctr"/>
                       <a:r>
-                        <a:rPr lang="en-US" sz="1400" baseline="0" dirty="0" smtClean="0">
+                        <a:rPr lang="en-US" sz="1600" baseline="0" dirty="0" smtClean="0">
                           <a:solidFill>
                             <a:schemeClr val="bg1">
                               <a:lumMod val="50000"/>
                             </a:schemeClr>
                           </a:solidFill>
                         </a:rPr>
-                        <a:t>Estimate model parameters in reference CRS</a:t>
+                        <a:t>Fit model </a:t>
                       </a:r>
-                      <a:endParaRPr lang="en-GB" sz="1400" dirty="0">
+                      <a:r>
+                        <a:rPr lang="en-US" sz="1600" baseline="0" dirty="0" smtClean="0">
+                          <a:solidFill>
+                            <a:schemeClr val="bg1">
+                              <a:lumMod val="50000"/>
+                            </a:schemeClr>
+                          </a:solidFill>
+                        </a:rPr>
+                        <a:t>parameters in reference CRS</a:t>
+                      </a:r>
+                      <a:endParaRPr lang="en-GB" sz="1600" dirty="0">
                         <a:solidFill>
                           <a:schemeClr val="bg1">
                             <a:lumMod val="50000"/>
@@ -3285,7 +3295,7 @@
                     <a:p>
                       <a:pPr algn="ctr"/>
                       <a:r>
-                        <a:rPr lang="en-US" sz="1400" dirty="0" smtClean="0">
+                        <a:rPr lang="en-US" sz="1600" dirty="0" smtClean="0">
                           <a:solidFill>
                             <a:schemeClr val="bg1">
                               <a:lumMod val="50000"/>
@@ -3295,7 +3305,7 @@
                         <a:t>Apply model in</a:t>
                       </a:r>
                       <a:r>
-                        <a:rPr lang="en-US" sz="1400" baseline="0" dirty="0" smtClean="0">
+                        <a:rPr lang="en-US" sz="1600" baseline="0" dirty="0" smtClean="0">
                           <a:solidFill>
                             <a:schemeClr val="bg1">
                               <a:lumMod val="50000"/>
@@ -3304,7 +3314,7 @@
                         </a:rPr>
                         <a:t> source CRS</a:t>
                       </a:r>
-                      <a:endParaRPr lang="en-GB" sz="1400" dirty="0">
+                      <a:endParaRPr lang="en-GB" sz="1600" dirty="0">
                         <a:solidFill>
                           <a:schemeClr val="accent3">
                             <a:lumMod val="75000"/>
@@ -3355,7 +3365,7 @@
                     <a:p>
                       <a:pPr algn="ctr"/>
                       <a:r>
-                        <a:rPr lang="en-US" sz="1400" dirty="0" smtClean="0">
+                        <a:rPr lang="en-US" sz="1600" dirty="0" smtClean="0">
                           <a:solidFill>
                             <a:schemeClr val="bg1">
                               <a:lumMod val="50000"/>
@@ -3364,7 +3374,7 @@
                         </a:rPr>
                         <a:t>Surface reflectance</a:t>
                       </a:r>
-                      <a:endParaRPr lang="en-GB" sz="1400" dirty="0">
+                      <a:endParaRPr lang="en-GB" sz="1600" dirty="0">
                         <a:solidFill>
                           <a:schemeClr val="bg1">
                             <a:lumMod val="50000"/>
@@ -3424,7 +3434,7 @@
                         <a:defRPr/>
                       </a:pPr>
                       <a:r>
-                        <a:rPr lang="en-US" sz="1400" b="1" dirty="0" smtClean="0">
+                        <a:rPr lang="en-US" sz="1600" b="1" dirty="0" smtClean="0">
                           <a:solidFill>
                             <a:schemeClr val="accent3">
                               <a:lumMod val="75000"/>
@@ -3735,7 +3745,7 @@
                         <a:defRPr/>
                       </a:pPr>
                       <a:r>
-                        <a:rPr lang="en-US" sz="1400" b="1" dirty="0" smtClean="0">
+                        <a:rPr lang="en-US" sz="1600" b="1" dirty="0" smtClean="0">
                           <a:solidFill>
                             <a:schemeClr val="accent1">
                               <a:lumMod val="75000"/>
@@ -3764,7 +3774,7 @@
                         <a:defRPr/>
                       </a:pPr>
                       <a:r>
-                        <a:rPr lang="en-US" sz="1400" b="1" dirty="0" smtClean="0">
+                        <a:rPr lang="en-US" sz="1600" b="1" dirty="0" smtClean="0">
                           <a:solidFill>
                             <a:schemeClr val="accent1">
                               <a:lumMod val="75000"/>
@@ -3982,7 +3992,7 @@
         </p:nvSpPr>
         <p:spPr>
           <a:xfrm>
-            <a:off x="2183511" y="2690827"/>
+            <a:off x="2133600" y="2738191"/>
             <a:ext cx="524584" cy="483650"/>
           </a:xfrm>
           <a:prstGeom prst="rect">
@@ -4027,7 +4037,7 @@
           <a:p>
             <a:pPr algn="ctr"/>
             <a:r>
-              <a:rPr lang="en-GB" sz="1200" b="1" dirty="0" smtClean="0">
+              <a:rPr lang="en-GB" sz="1400" b="1" dirty="0" smtClean="0">
                 <a:solidFill>
                   <a:schemeClr val="accent3">
                     <a:lumMod val="75000"/>
@@ -4036,7 +4046,7 @@
               </a:rPr>
               <a:t>ref</a:t>
             </a:r>
-            <a:endParaRPr lang="en-GB" sz="1200" b="1" dirty="0">
+            <a:endParaRPr lang="en-GB" sz="1400" b="1" dirty="0">
               <a:solidFill>
                 <a:schemeClr val="accent3">
                   <a:lumMod val="75000"/>
@@ -4054,8 +4064,8 @@
         </p:nvSpPr>
         <p:spPr>
           <a:xfrm>
-            <a:off x="2255303" y="4488450"/>
-            <a:ext cx="381000" cy="381000"/>
+            <a:off x="2133600" y="4488450"/>
+            <a:ext cx="396000" cy="381000"/>
           </a:xfrm>
           <a:prstGeom prst="rect">
             <a:avLst/>
@@ -4102,7 +4112,7 @@
           <a:p>
             <a:pPr algn="ctr"/>
             <a:r>
-              <a:rPr lang="en-GB" sz="1200" b="1" dirty="0" smtClean="0">
+              <a:rPr lang="en-GB" sz="1400" b="1" dirty="0" smtClean="0">
                 <a:solidFill>
                   <a:schemeClr val="accent1">
                     <a:lumMod val="75000"/>
@@ -4111,7 +4121,7 @@
               </a:rPr>
               <a:t>src</a:t>
             </a:r>
-            <a:endParaRPr lang="en-GB" sz="1200" b="1" dirty="0">
+            <a:endParaRPr lang="en-GB" sz="1400" b="1" dirty="0">
               <a:solidFill>
                 <a:schemeClr val="accent1">
                   <a:lumMod val="75000"/>
@@ -4129,7 +4139,7 @@
         </p:nvSpPr>
         <p:spPr>
           <a:xfrm>
-            <a:off x="3024545" y="2694929"/>
+            <a:off x="2971800" y="2742293"/>
             <a:ext cx="524584" cy="483650"/>
           </a:xfrm>
           <a:prstGeom prst="rect">
@@ -4174,7 +4184,7 @@
           <a:p>
             <a:pPr algn="ctr"/>
             <a:r>
-              <a:rPr lang="en-GB" sz="1200" b="1" dirty="0" smtClean="0">
+              <a:rPr lang="en-GB" sz="1400" b="1" dirty="0" smtClean="0">
                 <a:solidFill>
                   <a:schemeClr val="accent3">
                     <a:lumMod val="75000"/>
@@ -4183,7 +4193,7 @@
               </a:rPr>
               <a:t>ref</a:t>
             </a:r>
-            <a:endParaRPr lang="en-GB" sz="1200" b="1" dirty="0">
+            <a:endParaRPr lang="en-GB" sz="1400" b="1" dirty="0">
               <a:solidFill>
                 <a:schemeClr val="accent3">
                   <a:lumMod val="75000"/>
@@ -4201,8 +4211,8 @@
         </p:nvSpPr>
         <p:spPr>
           <a:xfrm>
-            <a:off x="3031787" y="3305436"/>
-            <a:ext cx="381000" cy="381000"/>
+            <a:off x="2971800" y="3352800"/>
+            <a:ext cx="396000" cy="381000"/>
           </a:xfrm>
           <a:prstGeom prst="rect">
             <a:avLst/>
@@ -4246,7 +4256,7 @@
           <a:p>
             <a:pPr algn="ctr"/>
             <a:r>
-              <a:rPr lang="en-US" sz="1200" b="1" dirty="0" smtClean="0">
+              <a:rPr lang="en-US" sz="1400" b="1" dirty="0" smtClean="0">
                 <a:solidFill>
                   <a:schemeClr val="accent3">
                     <a:lumMod val="75000"/>
@@ -4255,7 +4265,7 @@
               </a:rPr>
               <a:t>src</a:t>
             </a:r>
-            <a:endParaRPr lang="en-GB" sz="1200" b="1" dirty="0">
+            <a:endParaRPr lang="en-GB" sz="1400" b="1" dirty="0">
               <a:solidFill>
                 <a:schemeClr val="accent3">
                   <a:lumMod val="75000"/>
@@ -4273,7 +4283,7 @@
         </p:nvSpPr>
         <p:spPr>
           <a:xfrm>
-            <a:off x="3870525" y="2953828"/>
+            <a:off x="3870525" y="3001192"/>
             <a:ext cx="425870" cy="423520"/>
           </a:xfrm>
           <a:prstGeom prst="rect">
@@ -4332,8 +4342,8 @@
         </p:nvCxnSpPr>
         <p:spPr>
           <a:xfrm>
-            <a:off x="2708095" y="2932652"/>
-            <a:ext cx="316450" cy="4102"/>
+            <a:off x="2658184" y="2980016"/>
+            <a:ext cx="313616" cy="4102"/>
           </a:xfrm>
           <a:prstGeom prst="straightConnector1">
             <a:avLst/>
@@ -4374,8 +4384,8 @@
         </p:nvCxnSpPr>
         <p:spPr>
           <a:xfrm>
-            <a:off x="3549129" y="2936754"/>
-            <a:ext cx="321396" cy="228834"/>
+            <a:off x="3496384" y="2984118"/>
+            <a:ext cx="374141" cy="228834"/>
           </a:xfrm>
           <a:prstGeom prst="straightConnector1">
             <a:avLst/>
@@ -4413,8 +4423,8 @@
         </p:nvSpPr>
         <p:spPr>
           <a:xfrm>
-            <a:off x="3578183" y="2454775"/>
-            <a:ext cx="993817" cy="646331"/>
+            <a:off x="3505200" y="2461736"/>
+            <a:ext cx="1165397" cy="738664"/>
           </a:xfrm>
           <a:prstGeom prst="rect">
             <a:avLst/>
@@ -4428,7 +4438,7 @@
           <a:lstStyle/>
           <a:p>
             <a:r>
-              <a:rPr lang="en-US" sz="1200" dirty="0" smtClean="0">
+              <a:rPr lang="en-US" sz="1400" dirty="0" smtClean="0">
                 <a:solidFill>
                   <a:schemeClr val="tx1">
                     <a:lumMod val="65000"/>
@@ -4438,7 +4448,7 @@
               </a:rPr>
               <a:t>Local model fitting</a:t>
             </a:r>
-            <a:endParaRPr lang="el-GR" sz="1200" dirty="0">
+            <a:endParaRPr lang="el-GR" sz="1400" dirty="0">
               <a:solidFill>
                 <a:schemeClr val="tx1">
                   <a:lumMod val="65000"/>
@@ -4448,7 +4458,7 @@
             </a:endParaRPr>
           </a:p>
           <a:p>
-            <a:endParaRPr lang="en-GB" sz="1200" dirty="0"/>
+            <a:endParaRPr lang="en-GB" sz="1400" dirty="0"/>
           </a:p>
         </p:txBody>
       </p:sp>
@@ -4561,8 +4571,8 @@
         </p:nvCxnSpPr>
         <p:spPr>
           <a:xfrm flipV="1">
-            <a:off x="2636303" y="3686436"/>
-            <a:ext cx="585984" cy="992514"/>
+            <a:off x="2529600" y="3733800"/>
+            <a:ext cx="640200" cy="945150"/>
           </a:xfrm>
           <a:prstGeom prst="straightConnector1">
             <a:avLst/>
@@ -4599,9 +4609,9 @@
           <p:nvPr/>
         </p:nvSpPr>
         <p:spPr>
-          <a:xfrm rot="18072269">
-            <a:off x="2352930" y="3957059"/>
-            <a:ext cx="1024486" cy="276999"/>
+          <a:xfrm rot="18258824">
+            <a:off x="2233005" y="3861475"/>
+            <a:ext cx="1220155" cy="307777"/>
           </a:xfrm>
           <a:prstGeom prst="rect">
             <a:avLst/>
@@ -4615,7 +4625,7 @@
           <a:lstStyle/>
           <a:p>
             <a:r>
-              <a:rPr lang="en-US" sz="1200" dirty="0" err="1" smtClean="0">
+              <a:rPr lang="en-US" sz="1400" dirty="0" smtClean="0">
                 <a:solidFill>
                   <a:schemeClr val="tx1">
                     <a:lumMod val="65000"/>
@@ -4623,9 +4633,9 @@
                   </a:schemeClr>
                 </a:solidFill>
               </a:rPr>
-              <a:t>Downsample</a:t>
-            </a:r>
-            <a:endParaRPr lang="en-GB" sz="1200" dirty="0"/>
+              <a:t>Resample</a:t>
+            </a:r>
+            <a:endParaRPr lang="en-GB" sz="1400" dirty="0"/>
           </a:p>
         </p:txBody>
       </p:sp>
@@ -4637,7 +4647,7 @@
         </p:nvSpPr>
         <p:spPr>
           <a:xfrm>
-            <a:off x="4622311" y="3272033"/>
+            <a:off x="4622311" y="3319397"/>
             <a:ext cx="381000" cy="381000"/>
           </a:xfrm>
           <a:prstGeom prst="rect">
@@ -4682,7 +4692,7 @@
           <a:p>
             <a:pPr algn="ctr"/>
             <a:r>
-              <a:rPr lang="en-US" sz="1200" b="1" dirty="0" smtClean="0">
+              <a:rPr lang="en-US" sz="1400" b="1" dirty="0" smtClean="0">
                 <a:solidFill>
                   <a:schemeClr val="accent3">
                     <a:lumMod val="75000"/>
@@ -4691,7 +4701,7 @@
               </a:rPr>
               <a:t>M</a:t>
             </a:r>
-            <a:endParaRPr lang="en-GB" sz="1200" b="1" dirty="0">
+            <a:endParaRPr lang="en-GB" sz="1400" b="1" dirty="0">
               <a:solidFill>
                 <a:schemeClr val="accent3">
                   <a:lumMod val="75000"/>
@@ -4709,7 +4719,7 @@
         </p:nvSpPr>
         <p:spPr>
           <a:xfrm>
-            <a:off x="4616090" y="2746254"/>
+            <a:off x="4616090" y="2793618"/>
             <a:ext cx="381000" cy="381000"/>
           </a:xfrm>
           <a:prstGeom prst="rect">
@@ -4754,7 +4764,7 @@
           <a:p>
             <a:pPr algn="ctr"/>
             <a:r>
-              <a:rPr lang="en-US" sz="1200" b="1" dirty="0" smtClean="0">
+              <a:rPr lang="en-US" sz="1400" b="1" dirty="0" smtClean="0">
                 <a:solidFill>
                   <a:schemeClr val="accent3">
                     <a:lumMod val="75000"/>
@@ -4763,7 +4773,7 @@
               </a:rPr>
               <a:t>C</a:t>
             </a:r>
-            <a:endParaRPr lang="en-GB" sz="1200" b="1" dirty="0">
+            <a:endParaRPr lang="en-GB" sz="1400" b="1" dirty="0">
               <a:solidFill>
                 <a:schemeClr val="accent3">
                   <a:lumMod val="75000"/>
@@ -4784,7 +4794,7 @@
         </p:nvCxnSpPr>
         <p:spPr>
           <a:xfrm flipV="1">
-            <a:off x="4296395" y="2936754"/>
+            <a:off x="4296395" y="2984118"/>
             <a:ext cx="319695" cy="228834"/>
           </a:xfrm>
           <a:prstGeom prst="straightConnector1">
@@ -4826,7 +4836,7 @@
         </p:nvCxnSpPr>
         <p:spPr>
           <a:xfrm>
-            <a:off x="4296395" y="3165588"/>
+            <a:off x="4296395" y="3212952"/>
             <a:ext cx="325916" cy="296945"/>
           </a:xfrm>
           <a:prstGeom prst="straightConnector1">
@@ -4866,7 +4876,7 @@
         <p:spPr>
           <a:xfrm>
             <a:off x="5351490" y="4488028"/>
-            <a:ext cx="381000" cy="381000"/>
+            <a:ext cx="396000" cy="381000"/>
           </a:xfrm>
           <a:prstGeom prst="rect">
             <a:avLst/>
@@ -4913,7 +4923,7 @@
           <a:p>
             <a:pPr algn="ctr"/>
             <a:r>
-              <a:rPr lang="en-US" sz="1200" b="1" dirty="0" smtClean="0">
+              <a:rPr lang="en-US" sz="1400" b="1" dirty="0" smtClean="0">
                 <a:solidFill>
                   <a:schemeClr val="accent1">
                     <a:lumMod val="75000"/>
@@ -4922,7 +4932,7 @@
               </a:rPr>
               <a:t>src</a:t>
             </a:r>
-            <a:endParaRPr lang="en-GB" sz="1200" b="1" dirty="0">
+            <a:endParaRPr lang="en-GB" sz="1400" b="1" dirty="0">
               <a:solidFill>
                 <a:schemeClr val="accent1">
                   <a:lumMod val="75000"/>
@@ -4943,8 +4953,8 @@
         </p:nvCxnSpPr>
         <p:spPr>
           <a:xfrm flipV="1">
-            <a:off x="3412787" y="3165588"/>
-            <a:ext cx="457738" cy="330348"/>
+            <a:off x="3367800" y="3212952"/>
+            <a:ext cx="502725" cy="330348"/>
           </a:xfrm>
           <a:prstGeom prst="straightConnector1">
             <a:avLst/>
@@ -5030,7 +5040,7 @@
           <a:p>
             <a:pPr algn="ctr"/>
             <a:r>
-              <a:rPr lang="en-US" sz="1200" b="1" dirty="0" smtClean="0">
+              <a:rPr lang="en-US" sz="1400" b="1" dirty="0" smtClean="0">
                 <a:solidFill>
                   <a:schemeClr val="accent1">
                     <a:lumMod val="75000"/>
@@ -5039,7 +5049,7 @@
               </a:rPr>
               <a:t>M</a:t>
             </a:r>
-            <a:endParaRPr lang="en-GB" sz="1200" b="1" dirty="0">
+            <a:endParaRPr lang="en-GB" sz="1400" b="1" dirty="0">
               <a:solidFill>
                 <a:schemeClr val="accent1">
                   <a:lumMod val="75000"/>
@@ -5105,7 +5115,7 @@
           <a:p>
             <a:pPr algn="ctr"/>
             <a:r>
-              <a:rPr lang="en-US" sz="1200" b="1" dirty="0" smtClean="0">
+              <a:rPr lang="en-US" sz="1400" b="1" dirty="0" smtClean="0">
                 <a:solidFill>
                   <a:schemeClr val="accent1">
                     <a:lumMod val="75000"/>
@@ -5114,7 +5124,7 @@
               </a:rPr>
               <a:t>C</a:t>
             </a:r>
-            <a:endParaRPr lang="en-GB" sz="1200" b="1" dirty="0">
+            <a:endParaRPr lang="en-GB" sz="1400" b="1" dirty="0">
               <a:solidFill>
                 <a:schemeClr val="accent1">
                   <a:lumMod val="75000"/>
@@ -5135,8 +5145,8 @@
         </p:nvCxnSpPr>
         <p:spPr>
           <a:xfrm>
-            <a:off x="5003311" y="3462533"/>
-            <a:ext cx="1077359" cy="1025917"/>
+            <a:off x="5003311" y="3509897"/>
+            <a:ext cx="1077359" cy="978553"/>
           </a:xfrm>
           <a:prstGeom prst="straightConnector1">
             <a:avLst/>
@@ -5177,8 +5187,8 @@
         </p:nvCxnSpPr>
         <p:spPr>
           <a:xfrm>
-            <a:off x="4997090" y="2936754"/>
-            <a:ext cx="1683320" cy="1551274"/>
+            <a:off x="4997090" y="2984118"/>
+            <a:ext cx="1683320" cy="1503910"/>
           </a:xfrm>
           <a:prstGeom prst="straightConnector1">
             <a:avLst/>
@@ -5305,9 +5315,9 @@
           <p:nvPr/>
         </p:nvSpPr>
         <p:spPr>
-          <a:xfrm rot="2531067">
-            <a:off x="5506498" y="3551311"/>
-            <a:ext cx="938620" cy="276999"/>
+          <a:xfrm rot="2519039">
+            <a:off x="5476493" y="3530533"/>
+            <a:ext cx="938620" cy="307777"/>
           </a:xfrm>
           <a:prstGeom prst="rect">
             <a:avLst/>
@@ -5321,7 +5331,7 @@
           <a:lstStyle/>
           <a:p>
             <a:r>
-              <a:rPr lang="en-US" sz="1200" dirty="0" err="1" smtClean="0">
+              <a:rPr lang="en-US" sz="1400" dirty="0" smtClean="0">
                 <a:solidFill>
                   <a:schemeClr val="tx1">
                     <a:lumMod val="65000"/>
@@ -5329,9 +5339,9 @@
                   </a:schemeClr>
                 </a:solidFill>
               </a:rPr>
-              <a:t>Upsample</a:t>
-            </a:r>
-            <a:endParaRPr lang="en-US" sz="1200" dirty="0" smtClean="0">
+              <a:t>Resample</a:t>
+            </a:r>
+            <a:endParaRPr lang="en-US" sz="1400" dirty="0" smtClean="0">
               <a:solidFill>
                 <a:schemeClr val="tx1">
                   <a:lumMod val="65000"/>
@@ -5349,9 +5359,9 @@
           <p:nvPr/>
         </p:nvSpPr>
         <p:spPr>
-          <a:xfrm rot="2593608">
-            <a:off x="5258911" y="3816860"/>
-            <a:ext cx="841006" cy="276999"/>
+          <a:xfrm rot="2541060">
+            <a:off x="5204666" y="3832781"/>
+            <a:ext cx="978642" cy="307777"/>
           </a:xfrm>
           <a:prstGeom prst="rect">
             <a:avLst/>
@@ -5365,7 +5375,7 @@
           <a:lstStyle/>
           <a:p>
             <a:r>
-              <a:rPr lang="en-US" sz="1200" dirty="0" err="1" smtClean="0">
+              <a:rPr lang="en-US" sz="1400" dirty="0" smtClean="0">
                 <a:solidFill>
                   <a:schemeClr val="tx1">
                     <a:lumMod val="65000"/>
@@ -5373,9 +5383,9 @@
                   </a:schemeClr>
                 </a:solidFill>
               </a:rPr>
-              <a:t>Upsample</a:t>
-            </a:r>
-            <a:endParaRPr lang="en-US" sz="1200" dirty="0" smtClean="0">
+              <a:t>Resample</a:t>
+            </a:r>
+            <a:endParaRPr lang="en-US" sz="1400" dirty="0" smtClean="0">
               <a:solidFill>
                 <a:schemeClr val="tx1">
                   <a:lumMod val="65000"/>
@@ -5462,8 +5472,8 @@
         </p:nvCxnSpPr>
         <p:spPr>
           <a:xfrm flipV="1">
-            <a:off x="2636303" y="4678528"/>
-            <a:ext cx="2715187" cy="422"/>
+            <a:off x="2529600" y="4678528"/>
+            <a:ext cx="2821890" cy="422"/>
           </a:xfrm>
           <a:prstGeom prst="straightConnector1">
             <a:avLst/>
@@ -5493,8 +5503,8 @@
           </a:fontRef>
         </p:style>
       </p:cxnSp>
-      <mc:AlternateContent xmlns:mc="http://schemas.openxmlformats.org/markup-compatibility/2006" xmlns:a14="http://schemas.microsoft.com/office/drawing/2010/main">
-        <mc:Choice Requires="a14">
+      <mc:AlternateContent xmlns:mc="http://schemas.openxmlformats.org/markup-compatibility/2006">
+        <mc:Choice xmlns:a14="http://schemas.microsoft.com/office/drawing/2010/main" Requires="a14">
           <p:sp>
             <p:nvSpPr>
               <p:cNvPr id="34" name="TextBox 33"/>
@@ -5580,7 +5590,7 @@
             </p:txBody>
           </p:sp>
         </mc:Choice>
-        <mc:Fallback xmlns="">
+        <mc:Fallback>
           <p:sp>
             <p:nvSpPr>
               <p:cNvPr id="34" name="TextBox 33"/>
@@ -5627,8 +5637,8 @@
         </p:nvSpPr>
         <p:spPr>
           <a:xfrm>
-            <a:off x="4514766" y="2448580"/>
-            <a:ext cx="895434" cy="461665"/>
+            <a:off x="4500621" y="2460782"/>
+            <a:ext cx="1016992" cy="523220"/>
           </a:xfrm>
           <a:prstGeom prst="rect">
             <a:avLst/>
@@ -5642,7 +5652,7 @@
           <a:lstStyle/>
           <a:p>
             <a:r>
-              <a:rPr lang="en-US" sz="1200" dirty="0" smtClean="0">
+              <a:rPr lang="en-US" sz="1400" dirty="0" smtClean="0">
                 <a:solidFill>
                   <a:schemeClr val="tx1">
                     <a:lumMod val="65000"/>
@@ -5652,7 +5662,7 @@
               </a:rPr>
               <a:t>Parameters</a:t>
             </a:r>
-            <a:endParaRPr lang="el-GR" sz="1200" dirty="0" smtClean="0">
+            <a:endParaRPr lang="el-GR" sz="1400" dirty="0" smtClean="0">
               <a:solidFill>
                 <a:schemeClr val="tx1">
                   <a:lumMod val="65000"/>
@@ -5662,7 +5672,7 @@
             </a:endParaRPr>
           </a:p>
           <a:p>
-            <a:endParaRPr lang="en-GB" sz="1200" dirty="0"/>
+            <a:endParaRPr lang="en-GB" sz="1400" dirty="0"/>
           </a:p>
         </p:txBody>
       </p:sp>

</xml_diff>